<commit_message>
Update Charlie Fall Term 2024 presentation.pptx
</commit_message>
<xml_diff>
--- a/Current Presentation/Charlie Fall Term 2024 presentation.pptx
+++ b/Current Presentation/Charlie Fall Term 2024 presentation.pptx
@@ -104,6 +104,11 @@
       </a:defRPr>
     </a:lvl9pPr>
   </p:defaultTextStyle>
+  <p:extLst>
+    <p:ext uri="{EFAFB233-063F-42B5-8137-9DF3F51BA10A}">
+      <p15:sldGuideLst xmlns:p15="http://schemas.microsoft.com/office/powerpoint/2012/main"/>
+    </p:ext>
+  </p:extLst>
 </p:presentation>
 </file>
 
@@ -254,7 +259,7 @@
           <a:p>
             <a:fld id="{0F2E0057-352E-4528-A89B-462E0D2D677A}" type="datetimeFigureOut">
               <a:rPr lang="en-US" smtClean="0"/>
-              <a:t>2024-12-14</a:t>
+              <a:t>2024-12-15</a:t>
             </a:fld>
             <a:endParaRPr lang="en-US"/>
           </a:p>
@@ -452,7 +457,7 @@
           <a:p>
             <a:fld id="{0F2E0057-352E-4528-A89B-462E0D2D677A}" type="datetimeFigureOut">
               <a:rPr lang="en-US" smtClean="0"/>
-              <a:t>2024-12-14</a:t>
+              <a:t>2024-12-15</a:t>
             </a:fld>
             <a:endParaRPr lang="en-US"/>
           </a:p>
@@ -660,7 +665,7 @@
           <a:p>
             <a:fld id="{0F2E0057-352E-4528-A89B-462E0D2D677A}" type="datetimeFigureOut">
               <a:rPr lang="en-US" smtClean="0"/>
-              <a:t>2024-12-14</a:t>
+              <a:t>2024-12-15</a:t>
             </a:fld>
             <a:endParaRPr lang="en-US"/>
           </a:p>
@@ -858,7 +863,7 @@
           <a:p>
             <a:fld id="{0F2E0057-352E-4528-A89B-462E0D2D677A}" type="datetimeFigureOut">
               <a:rPr lang="en-US" smtClean="0"/>
-              <a:t>2024-12-14</a:t>
+              <a:t>2024-12-15</a:t>
             </a:fld>
             <a:endParaRPr lang="en-US"/>
           </a:p>
@@ -1133,7 +1138,7 @@
           <a:p>
             <a:fld id="{0F2E0057-352E-4528-A89B-462E0D2D677A}" type="datetimeFigureOut">
               <a:rPr lang="en-US" smtClean="0"/>
-              <a:t>2024-12-14</a:t>
+              <a:t>2024-12-15</a:t>
             </a:fld>
             <a:endParaRPr lang="en-US"/>
           </a:p>
@@ -1398,7 +1403,7 @@
           <a:p>
             <a:fld id="{0F2E0057-352E-4528-A89B-462E0D2D677A}" type="datetimeFigureOut">
               <a:rPr lang="en-US" smtClean="0"/>
-              <a:t>2024-12-14</a:t>
+              <a:t>2024-12-15</a:t>
             </a:fld>
             <a:endParaRPr lang="en-US"/>
           </a:p>
@@ -1810,7 +1815,7 @@
           <a:p>
             <a:fld id="{0F2E0057-352E-4528-A89B-462E0D2D677A}" type="datetimeFigureOut">
               <a:rPr lang="en-US" smtClean="0"/>
-              <a:t>2024-12-14</a:t>
+              <a:t>2024-12-15</a:t>
             </a:fld>
             <a:endParaRPr lang="en-US"/>
           </a:p>
@@ -1951,7 +1956,7 @@
           <a:p>
             <a:fld id="{0F2E0057-352E-4528-A89B-462E0D2D677A}" type="datetimeFigureOut">
               <a:rPr lang="en-US" smtClean="0"/>
-              <a:t>2024-12-14</a:t>
+              <a:t>2024-12-15</a:t>
             </a:fld>
             <a:endParaRPr lang="en-US"/>
           </a:p>
@@ -2064,7 +2069,7 @@
           <a:p>
             <a:fld id="{0F2E0057-352E-4528-A89B-462E0D2D677A}" type="datetimeFigureOut">
               <a:rPr lang="en-US" smtClean="0"/>
-              <a:t>2024-12-14</a:t>
+              <a:t>2024-12-15</a:t>
             </a:fld>
             <a:endParaRPr lang="en-US"/>
           </a:p>
@@ -2375,7 +2380,7 @@
           <a:p>
             <a:fld id="{0F2E0057-352E-4528-A89B-462E0D2D677A}" type="datetimeFigureOut">
               <a:rPr lang="en-US" smtClean="0"/>
-              <a:t>2024-12-14</a:t>
+              <a:t>2024-12-15</a:t>
             </a:fld>
             <a:endParaRPr lang="en-US"/>
           </a:p>
@@ -2663,7 +2668,7 @@
           <a:p>
             <a:fld id="{0F2E0057-352E-4528-A89B-462E0D2D677A}" type="datetimeFigureOut">
               <a:rPr lang="en-US" smtClean="0"/>
-              <a:t>2024-12-14</a:t>
+              <a:t>2024-12-15</a:t>
             </a:fld>
             <a:endParaRPr lang="en-US"/>
           </a:p>
@@ -2904,7 +2909,7 @@
           <a:p>
             <a:fld id="{0F2E0057-352E-4528-A89B-462E0D2D677A}" type="datetimeFigureOut">
               <a:rPr lang="en-US" smtClean="0"/>
-              <a:t>2024-12-14</a:t>
+              <a:t>2024-12-15</a:t>
             </a:fld>
             <a:endParaRPr lang="en-US"/>
           </a:p>
@@ -3397,7 +3402,7 @@
         </p:nvSpPr>
         <p:spPr>
           <a:xfrm>
-            <a:off x="1374648" y="914400"/>
+            <a:off x="1371600" y="914400"/>
             <a:ext cx="9144000" cy="2387600"/>
           </a:xfrm>
           <a:prstGeom prst="rect">
@@ -3484,205 +3489,6 @@
           </a:p>
         </p:txBody>
       </p:sp>
-      <p:sp>
-        <p:nvSpPr>
-          <p:cNvPr id="6" name="Oval 5">
-            <a:extLst>
-              <a:ext uri="{FF2B5EF4-FFF2-40B4-BE49-F238E27FC236}">
-                <a16:creationId xmlns:a16="http://schemas.microsoft.com/office/drawing/2014/main" id="{10AF82AD-4E7D-3287-18D5-E61F3CB4E707}"/>
-              </a:ext>
-            </a:extLst>
-          </p:cNvPr>
-          <p:cNvSpPr/>
-          <p:nvPr/>
-        </p:nvSpPr>
-        <p:spPr>
-          <a:xfrm>
-            <a:off x="257175" y="398351"/>
-            <a:ext cx="11553825" cy="3204927"/>
-          </a:xfrm>
-          <a:prstGeom prst="ellipse">
-            <a:avLst/>
-          </a:prstGeom>
-          <a:solidFill>
-            <a:srgbClr val="000080"/>
-          </a:solidFill>
-          <a:ln>
-            <a:noFill/>
-          </a:ln>
-          <a:effectLst>
-            <a:glow rad="38100">
-              <a:srgbClr val="000080">
-                <a:alpha val="60000"/>
-              </a:srgbClr>
-            </a:glow>
-            <a:softEdge rad="31750"/>
-          </a:effectLst>
-        </p:spPr>
-        <p:style>
-          <a:lnRef idx="2">
-            <a:schemeClr val="accent1">
-              <a:shade val="15000"/>
-            </a:schemeClr>
-          </a:lnRef>
-          <a:fillRef idx="1">
-            <a:schemeClr val="accent1"/>
-          </a:fillRef>
-          <a:effectRef idx="0">
-            <a:schemeClr val="accent1"/>
-          </a:effectRef>
-          <a:fontRef idx="minor">
-            <a:schemeClr val="lt1"/>
-          </a:fontRef>
-        </p:style>
-        <p:txBody>
-          <a:bodyPr rtlCol="0" anchor="ctr"/>
-          <a:lstStyle/>
-          <a:p>
-            <a:pPr algn="ctr"/>
-            <a:endParaRPr lang="en-US"/>
-          </a:p>
-        </p:txBody>
-      </p:sp>
-      <p:sp>
-        <p:nvSpPr>
-          <p:cNvPr id="5" name="Title 1">
-            <a:extLst>
-              <a:ext uri="{FF2B5EF4-FFF2-40B4-BE49-F238E27FC236}">
-                <a16:creationId xmlns:a16="http://schemas.microsoft.com/office/drawing/2014/main" id="{8349CD14-B416-F242-F249-82A5DC8216C8}"/>
-              </a:ext>
-            </a:extLst>
-          </p:cNvPr>
-          <p:cNvSpPr txBox="1">
-            <a:spLocks/>
-          </p:cNvSpPr>
-          <p:nvPr/>
-        </p:nvSpPr>
-        <p:spPr>
-          <a:xfrm>
-            <a:off x="1368552" y="914400"/>
-            <a:ext cx="9144000" cy="2387600"/>
-          </a:xfrm>
-          <a:prstGeom prst="rect">
-            <a:avLst/>
-          </a:prstGeom>
-        </p:spPr>
-        <p:txBody>
-          <a:bodyPr vert="horz" lIns="91440" tIns="45720" rIns="91440" bIns="45720" rtlCol="0" anchor="ctr">
-            <a:normAutofit/>
-          </a:bodyPr>
-          <a:lstStyle>
-            <a:lvl1pPr algn="ctr" defTabSz="914400" rtl="0" eaLnBrk="1" latinLnBrk="0" hangingPunct="1">
-              <a:lnSpc>
-                <a:spcPct val="90000"/>
-              </a:lnSpc>
-              <a:spcBef>
-                <a:spcPct val="0"/>
-              </a:spcBef>
-              <a:buNone/>
-              <a:defRPr sz="6000" kern="1200">
-                <a:solidFill>
-                  <a:schemeClr val="tx1"/>
-                </a:solidFill>
-                <a:latin typeface="+mj-lt"/>
-                <a:ea typeface="+mj-ea"/>
-                <a:cs typeface="+mj-cs"/>
-              </a:defRPr>
-            </a:lvl1pPr>
-          </a:lstStyle>
-          <a:p>
-            <a:r>
-              <a:rPr lang="en-US" sz="7200" b="1" dirty="0">
-                <a:solidFill>
-                  <a:srgbClr val="FF0000"/>
-                </a:solidFill>
-                <a:highlight>
-                  <a:srgbClr val="000080"/>
-                </a:highlight>
-              </a:rPr>
-              <a:t>Charlie Hatch’s “Fall” Presentation- 2024</a:t>
-            </a:r>
-          </a:p>
-        </p:txBody>
-      </p:sp>
-      <p:sp>
-        <p:nvSpPr>
-          <p:cNvPr id="7" name="TextBox 6">
-            <a:extLst>
-              <a:ext uri="{FF2B5EF4-FFF2-40B4-BE49-F238E27FC236}">
-                <a16:creationId xmlns:a16="http://schemas.microsoft.com/office/drawing/2014/main" id="{EDDAE2F4-DB81-3A9D-2808-5B4900718D1B}"/>
-              </a:ext>
-            </a:extLst>
-          </p:cNvPr>
-          <p:cNvSpPr txBox="1"/>
-          <p:nvPr/>
-        </p:nvSpPr>
-        <p:spPr>
-          <a:xfrm>
-            <a:off x="4672584" y="758951"/>
-            <a:ext cx="2615184" cy="369332"/>
-          </a:xfrm>
-          <a:prstGeom prst="rect">
-            <a:avLst/>
-          </a:prstGeom>
-          <a:noFill/>
-        </p:spPr>
-        <p:txBody>
-          <a:bodyPr wrap="square" rtlCol="0">
-            <a:spAutoFit/>
-          </a:bodyPr>
-          <a:lstStyle/>
-          <a:p>
-            <a:r>
-              <a:rPr lang="en-US" dirty="0">
-                <a:solidFill>
-                  <a:srgbClr val="002080"/>
-                </a:solidFill>
-              </a:rPr>
-              <a:t>Isn’t this format better?</a:t>
-            </a:r>
-          </a:p>
-        </p:txBody>
-      </p:sp>
-      <p:sp>
-        <p:nvSpPr>
-          <p:cNvPr id="10" name="TextBox 9">
-            <a:extLst>
-              <a:ext uri="{FF2B5EF4-FFF2-40B4-BE49-F238E27FC236}">
-                <a16:creationId xmlns:a16="http://schemas.microsoft.com/office/drawing/2014/main" id="{F13D9209-E238-AFB6-7595-5D719135E2BC}"/>
-              </a:ext>
-            </a:extLst>
-          </p:cNvPr>
-          <p:cNvSpPr txBox="1"/>
-          <p:nvPr/>
-        </p:nvSpPr>
-        <p:spPr>
-          <a:xfrm>
-            <a:off x="4118039" y="683942"/>
-            <a:ext cx="3724274" cy="519351"/>
-          </a:xfrm>
-          <a:prstGeom prst="ellipse">
-            <a:avLst/>
-          </a:prstGeom>
-          <a:solidFill>
-            <a:schemeClr val="bg1">
-              <a:lumMod val="95000"/>
-            </a:schemeClr>
-          </a:solidFill>
-        </p:spPr>
-        <p:txBody>
-          <a:bodyPr wrap="square" rtlCol="0">
-            <a:spAutoFit/>
-          </a:bodyPr>
-          <a:lstStyle/>
-          <a:p>
-            <a:r>
-              <a:rPr lang="en-US" dirty="0"/>
-              <a:t>Isn’t this format better?</a:t>
-            </a:r>
-          </a:p>
-        </p:txBody>
-      </p:sp>
     </p:spTree>
     <p:extLst>
       <p:ext uri="{BB962C8B-B14F-4D97-AF65-F5344CB8AC3E}">
@@ -3693,8 +3499,8 @@
   <p:clrMapOvr>
     <a:masterClrMapping/>
   </p:clrMapOvr>
-  <mc:AlternateContent xmlns:mc="http://schemas.openxmlformats.org/markup-compatibility/2006">
-    <mc:Choice xmlns:p14="http://schemas.microsoft.com/office/powerpoint/2010/main" Requires="p14">
+  <mc:AlternateContent xmlns:mc="http://schemas.openxmlformats.org/markup-compatibility/2006" xmlns:p14="http://schemas.microsoft.com/office/powerpoint/2010/main">
+    <mc:Choice Requires="p14">
       <p:timing>
         <p:tnLst>
           <p:par>
@@ -3823,80 +3629,8 @@
                                       </p:childTnLst>
                                     </p:cTn>
                                   </p:par>
-                                </p:childTnLst>
-                              </p:cTn>
-                            </p:par>
-                          </p:childTnLst>
-                        </p:cTn>
-                      </p:par>
-                      <p:par>
-                        <p:cTn id="13" fill="hold">
-                          <p:stCondLst>
-                            <p:cond delay="indefinite"/>
-                          </p:stCondLst>
-                          <p:childTnLst>
-                            <p:par>
-                              <p:cTn id="14" fill="hold">
-                                <p:stCondLst>
-                                  <p:cond delay="0"/>
-                                </p:stCondLst>
-                                <p:childTnLst>
                                   <p:par>
-                                    <p:cTn id="15" presetID="1" presetClass="entr" presetSubtype="0" fill="hold" grpId="0" nodeType="clickEffect">
-                                      <p:stCondLst>
-                                        <p:cond delay="0"/>
-                                      </p:stCondLst>
-                                      <p:childTnLst>
-                                        <p:set>
-                                          <p:cBhvr>
-                                            <p:cTn id="16" dur="1" fill="hold">
-                                              <p:stCondLst>
-                                                <p:cond delay="0"/>
-                                              </p:stCondLst>
-                                            </p:cTn>
-                                            <p:tgtEl>
-                                              <p:spTgt spid="6"/>
-                                            </p:tgtEl>
-                                            <p:attrNameLst>
-                                              <p:attrName>style.visibility</p:attrName>
-                                            </p:attrNameLst>
-                                          </p:cBhvr>
-                                          <p:to>
-                                            <p:strVal val="visible"/>
-                                          </p:to>
-                                        </p:set>
-                                      </p:childTnLst>
-                                    </p:cTn>
-                                  </p:par>
-                                  <p:par>
-                                    <p:cTn id="17" presetID="1" presetClass="entr" presetSubtype="0" fill="hold" grpId="0" nodeType="withEffect">
-                                      <p:stCondLst>
-                                        <p:cond delay="0"/>
-                                      </p:stCondLst>
-                                      <p:childTnLst>
-                                        <p:set>
-                                          <p:cBhvr>
-                                            <p:cTn id="18" dur="1" fill="hold">
-                                              <p:stCondLst>
-                                                <p:cond delay="0"/>
-                                              </p:stCondLst>
-                                            </p:cTn>
-                                            <p:tgtEl>
-                                              <p:spTgt spid="5"/>
-                                            </p:tgtEl>
-                                            <p:attrNameLst>
-                                              <p:attrName>style.visibility</p:attrName>
-                                            </p:attrNameLst>
-                                          </p:cBhvr>
-                                          <p:to>
-                                            <p:strVal val="visible"/>
-                                          </p:to>
-                                        </p:set>
-                                      </p:childTnLst>
-                                    </p:cTn>
-                                  </p:par>
-                                  <p:par>
-                                    <p:cTn id="19" presetID="1" presetClass="exit" presetSubtype="0" fill="hold" grpId="1" nodeType="withEffect">
+                                    <p:cTn id="13" presetID="1" presetClass="exit" presetSubtype="0" fill="hold" grpId="1" nodeType="withEffect">
                                       <p:stCondLst>
                                         <p:cond delay="0"/>
                                       </p:stCondLst>
@@ -3906,158 +3640,13 @@
                                       <p:childTnLst>
                                         <p:set>
                                           <p:cBhvr>
-                                            <p:cTn id="20" dur="1" fill="hold">
+                                            <p:cTn id="14" dur="1" fill="hold">
                                               <p:stCondLst>
                                                 <p:cond delay="0"/>
                                               </p:stCondLst>
                                             </p:cTn>
                                             <p:tgtEl>
                                               <p:spTgt spid="4"/>
-                                            </p:tgtEl>
-                                            <p:attrNameLst>
-                                              <p:attrName>style.visibility</p:attrName>
-                                            </p:attrNameLst>
-                                          </p:cBhvr>
-                                          <p:to>
-                                            <p:strVal val="hidden"/>
-                                          </p:to>
-                                        </p:set>
-                                      </p:childTnLst>
-                                    </p:cTn>
-                                  </p:par>
-                                  <p:par>
-                                    <p:cTn id="21" presetID="2" presetClass="entr" presetSubtype="1" fill="hold" grpId="0" nodeType="withEffect" p14:presetBounceEnd="75000">
-                                      <p:stCondLst>
-                                        <p:cond delay="500"/>
-                                      </p:stCondLst>
-                                      <p:childTnLst>
-                                        <p:set>
-                                          <p:cBhvr>
-                                            <p:cTn id="22" dur="1" fill="hold">
-                                              <p:stCondLst>
-                                                <p:cond delay="0"/>
-                                              </p:stCondLst>
-                                            </p:cTn>
-                                            <p:tgtEl>
-                                              <p:spTgt spid="7"/>
-                                            </p:tgtEl>
-                                            <p:attrNameLst>
-                                              <p:attrName>style.visibility</p:attrName>
-                                            </p:attrNameLst>
-                                          </p:cBhvr>
-                                          <p:to>
-                                            <p:strVal val="visible"/>
-                                          </p:to>
-                                        </p:set>
-                                        <p:anim calcmode="lin" valueType="num" p14:bounceEnd="75000">
-                                          <p:cBhvr additive="base">
-                                            <p:cTn id="23" dur="1000" fill="hold"/>
-                                            <p:tgtEl>
-                                              <p:spTgt spid="7"/>
-                                            </p:tgtEl>
-                                            <p:attrNameLst>
-                                              <p:attrName>ppt_x</p:attrName>
-                                            </p:attrNameLst>
-                                          </p:cBhvr>
-                                          <p:tavLst>
-                                            <p:tav tm="0">
-                                              <p:val>
-                                                <p:strVal val="#ppt_x"/>
-                                              </p:val>
-                                            </p:tav>
-                                            <p:tav tm="100000">
-                                              <p:val>
-                                                <p:strVal val="#ppt_x"/>
-                                              </p:val>
-                                            </p:tav>
-                                          </p:tavLst>
-                                        </p:anim>
-                                        <p:anim calcmode="lin" valueType="num" p14:bounceEnd="75000">
-                                          <p:cBhvr additive="base">
-                                            <p:cTn id="24" dur="1000" fill="hold"/>
-                                            <p:tgtEl>
-                                              <p:spTgt spid="7"/>
-                                            </p:tgtEl>
-                                            <p:attrNameLst>
-                                              <p:attrName>ppt_y</p:attrName>
-                                            </p:attrNameLst>
-                                          </p:cBhvr>
-                                          <p:tavLst>
-                                            <p:tav tm="0">
-                                              <p:val>
-                                                <p:strVal val="0-#ppt_h/2"/>
-                                              </p:val>
-                                            </p:tav>
-                                            <p:tav tm="100000">
-                                              <p:val>
-                                                <p:strVal val="#ppt_y"/>
-                                              </p:val>
-                                            </p:tav>
-                                          </p:tavLst>
-                                        </p:anim>
-                                      </p:childTnLst>
-                                    </p:cTn>
-                                  </p:par>
-                                </p:childTnLst>
-                              </p:cTn>
-                            </p:par>
-                            <p:par>
-                              <p:cTn id="25" fill="hold">
-                                <p:stCondLst>
-                                  <p:cond delay="3601"/>
-                                </p:stCondLst>
-                                <p:childTnLst>
-                                  <p:par>
-                                    <p:cTn id="26" presetID="1" presetClass="entr" presetSubtype="0" fill="hold" grpId="1" nodeType="afterEffect">
-                                      <p:stCondLst>
-                                        <p:cond delay="500"/>
-                                      </p:stCondLst>
-                                      <p:childTnLst>
-                                        <p:set>
-                                          <p:cBhvr>
-                                            <p:cTn id="27" dur="1" fill="hold">
-                                              <p:stCondLst>
-                                                <p:cond delay="0"/>
-                                              </p:stCondLst>
-                                            </p:cTn>
-                                            <p:tgtEl>
-                                              <p:spTgt spid="10"/>
-                                            </p:tgtEl>
-                                            <p:attrNameLst>
-                                              <p:attrName>style.visibility</p:attrName>
-                                            </p:attrNameLst>
-                                          </p:cBhvr>
-                                          <p:to>
-                                            <p:strVal val="visible"/>
-                                          </p:to>
-                                        </p:set>
-                                      </p:childTnLst>
-                                    </p:cTn>
-                                  </p:par>
-                                </p:childTnLst>
-                              </p:cTn>
-                            </p:par>
-                            <p:par>
-                              <p:cTn id="28" fill="hold">
-                                <p:stCondLst>
-                                  <p:cond delay="4101"/>
-                                </p:stCondLst>
-                                <p:childTnLst>
-                                  <p:par>
-                                    <p:cTn id="29" presetID="1" presetClass="exit" presetSubtype="0" fill="hold" grpId="0" nodeType="afterEffect">
-                                      <p:stCondLst>
-                                        <p:cond delay="100"/>
-                                      </p:stCondLst>
-                                      <p:childTnLst>
-                                        <p:set>
-                                          <p:cBhvr>
-                                            <p:cTn id="30" dur="1" fill="hold">
-                                              <p:stCondLst>
-                                                <p:cond delay="0"/>
-                                              </p:stCondLst>
-                                            </p:cTn>
-                                            <p:tgtEl>
-                                              <p:spTgt spid="10"/>
                                             </p:tgtEl>
                                             <p:attrNameLst>
                                               <p:attrName>style.visibility</p:attrName>
@@ -4077,19 +3666,19 @@
                         </p:cTn>
                       </p:par>
                       <p:par>
-                        <p:cTn id="31" fill="hold">
+                        <p:cTn id="15" fill="hold">
                           <p:stCondLst>
                             <p:cond delay="indefinite"/>
                           </p:stCondLst>
                           <p:childTnLst>
                             <p:par>
-                              <p:cTn id="32" fill="hold">
+                              <p:cTn id="16" fill="hold">
                                 <p:stCondLst>
                                   <p:cond delay="0"/>
                                 </p:stCondLst>
                                 <p:childTnLst>
                                   <p:par>
-                                    <p:cTn id="33" presetID="25" presetClass="entr" presetSubtype="0" fill="hold" grpId="0" nodeType="clickEffect">
+                                    <p:cTn id="17" presetID="25" presetClass="entr" presetSubtype="0" fill="hold" grpId="0" nodeType="clickEffect">
                                       <p:stCondLst>
                                         <p:cond delay="0"/>
                                       </p:stCondLst>
@@ -4099,7 +3688,7 @@
                                       <p:childTnLst>
                                         <p:set>
                                           <p:cBhvr>
-                                            <p:cTn id="34" dur="1" fill="hold">
+                                            <p:cTn id="18" dur="1" fill="hold">
                                               <p:stCondLst>
                                                 <p:cond delay="0"/>
                                               </p:stCondLst>
@@ -4117,7 +3706,7 @@
                                         </p:set>
                                         <p:anim calcmode="lin" valueType="num">
                                           <p:cBhvr>
-                                            <p:cTn id="35" dur="500" decel="50000" fill="hold">
+                                            <p:cTn id="19" dur="500" decel="50000" fill="hold">
                                               <p:stCondLst>
                                                 <p:cond delay="0"/>
                                               </p:stCondLst>
@@ -4144,7 +3733,7 @@
                                         </p:anim>
                                         <p:anim calcmode="lin" valueType="num">
                                           <p:cBhvr>
-                                            <p:cTn id="36" dur="500" decel="50000" fill="hold">
+                                            <p:cTn id="20" dur="500" decel="50000" fill="hold">
                                               <p:stCondLst>
                                                 <p:cond delay="0"/>
                                               </p:stCondLst>
@@ -4171,7 +3760,7 @@
                                         </p:anim>
                                         <p:anim calcmode="lin" valueType="num">
                                           <p:cBhvr>
-                                            <p:cTn id="37" dur="500" accel="50000" fill="hold">
+                                            <p:cTn id="21" dur="500" accel="50000" fill="hold">
                                               <p:stCondLst>
                                                 <p:cond delay="500"/>
                                               </p:stCondLst>
@@ -4198,7 +3787,7 @@
                                         </p:anim>
                                         <p:anim calcmode="lin" valueType="num">
                                           <p:cBhvr>
-                                            <p:cTn id="38" dur="1000" fill="hold"/>
+                                            <p:cTn id="22" dur="1000" fill="hold"/>
                                             <p:tgtEl>
                                               <p:spTgt spid="3"/>
                                             </p:tgtEl>
@@ -4221,7 +3810,7 @@
                                         </p:anim>
                                         <p:anim calcmode="lin" valueType="num">
                                           <p:cBhvr>
-                                            <p:cTn id="39" dur="500" decel="50000" fill="hold">
+                                            <p:cTn id="23" dur="500" decel="50000" fill="hold">
                                               <p:stCondLst>
                                                 <p:cond delay="0"/>
                                               </p:stCondLst>
@@ -4248,7 +3837,7 @@
                                         </p:anim>
                                         <p:anim calcmode="lin" valueType="num">
                                           <p:cBhvr>
-                                            <p:cTn id="40" dur="500" decel="50000" fill="hold">
+                                            <p:cTn id="24" dur="500" decel="50000" fill="hold">
                                               <p:stCondLst>
                                                 <p:cond delay="0"/>
                                               </p:stCondLst>
@@ -4275,7 +3864,7 @@
                                         </p:anim>
                                         <p:anim calcmode="lin" valueType="num">
                                           <p:cBhvr>
-                                            <p:cTn id="41" dur="500" accel="50000" fill="hold">
+                                            <p:cTn id="25" dur="500" accel="50000" fill="hold">
                                               <p:stCondLst>
                                                 <p:cond delay="500"/>
                                               </p:stCondLst>
@@ -4302,7 +3891,7 @@
                                         </p:anim>
                                         <p:animEffect transition="in" filter="fade">
                                           <p:cBhvr>
-                                            <p:cTn id="42" dur="1000" decel="50000">
+                                            <p:cTn id="26" dur="1000" decel="50000">
                                               <p:stCondLst>
                                                 <p:cond delay="0"/>
                                               </p:stCondLst>
@@ -4348,15 +3937,10 @@
           <p:bldP spid="4" grpId="0"/>
           <p:bldP spid="4" grpId="1"/>
           <p:bldP spid="3" grpId="0"/>
-          <p:bldP spid="6" grpId="0" animBg="1"/>
-          <p:bldP spid="5" grpId="0"/>
-          <p:bldP spid="7" grpId="0"/>
-          <p:bldP spid="10" grpId="0" animBg="1"/>
-          <p:bldP spid="10" grpId="1" animBg="1"/>
         </p:bldLst>
       </p:timing>
     </mc:Choice>
-    <mc:Fallback>
+    <mc:Fallback xmlns="">
       <p:timing>
         <p:tnLst>
           <p:par>

</xml_diff>

<commit_message>
ignore temp files and update
modifed so that temp files won't be uploaded, and updated presentation
</commit_message>
<xml_diff>
--- a/Current Presentation/Charlie Fall Term 2024 presentation.pptx
+++ b/Current Presentation/Charlie Fall Term 2024 presentation.pptx
@@ -6,7 +6,10 @@
   </p:sldMasterIdLst>
   <p:sldIdLst>
     <p:sldId id="256" r:id="rId2"/>
-    <p:sldId id="257" r:id="rId3"/>
+    <p:sldId id="258" r:id="rId3"/>
+    <p:sldId id="259" r:id="rId4"/>
+    <p:sldId id="260" r:id="rId5"/>
+    <p:sldId id="257" r:id="rId6"/>
   </p:sldIdLst>
   <p:sldSz cx="12192000" cy="6858000"/>
   <p:notesSz cx="6858000" cy="9144000"/>
@@ -260,7 +263,7 @@
           <a:p>
             <a:fld id="{0F2E0057-352E-4528-A89B-462E0D2D677A}" type="datetimeFigureOut">
               <a:rPr lang="en-US" smtClean="0"/>
-              <a:t>2024-12-15</a:t>
+              <a:t>12/16/2024</a:t>
             </a:fld>
             <a:endParaRPr lang="en-US"/>
           </a:p>
@@ -458,7 +461,7 @@
           <a:p>
             <a:fld id="{0F2E0057-352E-4528-A89B-462E0D2D677A}" type="datetimeFigureOut">
               <a:rPr lang="en-US" smtClean="0"/>
-              <a:t>2024-12-15</a:t>
+              <a:t>12/16/2024</a:t>
             </a:fld>
             <a:endParaRPr lang="en-US"/>
           </a:p>
@@ -666,7 +669,7 @@
           <a:p>
             <a:fld id="{0F2E0057-352E-4528-A89B-462E0D2D677A}" type="datetimeFigureOut">
               <a:rPr lang="en-US" smtClean="0"/>
-              <a:t>2024-12-15</a:t>
+              <a:t>12/16/2024</a:t>
             </a:fld>
             <a:endParaRPr lang="en-US"/>
           </a:p>
@@ -864,7 +867,7 @@
           <a:p>
             <a:fld id="{0F2E0057-352E-4528-A89B-462E0D2D677A}" type="datetimeFigureOut">
               <a:rPr lang="en-US" smtClean="0"/>
-              <a:t>2024-12-15</a:t>
+              <a:t>12/16/2024</a:t>
             </a:fld>
             <a:endParaRPr lang="en-US"/>
           </a:p>
@@ -1139,7 +1142,7 @@
           <a:p>
             <a:fld id="{0F2E0057-352E-4528-A89B-462E0D2D677A}" type="datetimeFigureOut">
               <a:rPr lang="en-US" smtClean="0"/>
-              <a:t>2024-12-15</a:t>
+              <a:t>12/16/2024</a:t>
             </a:fld>
             <a:endParaRPr lang="en-US"/>
           </a:p>
@@ -1404,7 +1407,7 @@
           <a:p>
             <a:fld id="{0F2E0057-352E-4528-A89B-462E0D2D677A}" type="datetimeFigureOut">
               <a:rPr lang="en-US" smtClean="0"/>
-              <a:t>2024-12-15</a:t>
+              <a:t>12/16/2024</a:t>
             </a:fld>
             <a:endParaRPr lang="en-US"/>
           </a:p>
@@ -1816,7 +1819,7 @@
           <a:p>
             <a:fld id="{0F2E0057-352E-4528-A89B-462E0D2D677A}" type="datetimeFigureOut">
               <a:rPr lang="en-US" smtClean="0"/>
-              <a:t>2024-12-15</a:t>
+              <a:t>12/16/2024</a:t>
             </a:fld>
             <a:endParaRPr lang="en-US"/>
           </a:p>
@@ -1957,7 +1960,7 @@
           <a:p>
             <a:fld id="{0F2E0057-352E-4528-A89B-462E0D2D677A}" type="datetimeFigureOut">
               <a:rPr lang="en-US" smtClean="0"/>
-              <a:t>2024-12-15</a:t>
+              <a:t>12/16/2024</a:t>
             </a:fld>
             <a:endParaRPr lang="en-US"/>
           </a:p>
@@ -2070,7 +2073,7 @@
           <a:p>
             <a:fld id="{0F2E0057-352E-4528-A89B-462E0D2D677A}" type="datetimeFigureOut">
               <a:rPr lang="en-US" smtClean="0"/>
-              <a:t>2024-12-15</a:t>
+              <a:t>12/16/2024</a:t>
             </a:fld>
             <a:endParaRPr lang="en-US"/>
           </a:p>
@@ -2381,7 +2384,7 @@
           <a:p>
             <a:fld id="{0F2E0057-352E-4528-A89B-462E0D2D677A}" type="datetimeFigureOut">
               <a:rPr lang="en-US" smtClean="0"/>
-              <a:t>2024-12-15</a:t>
+              <a:t>12/16/2024</a:t>
             </a:fld>
             <a:endParaRPr lang="en-US"/>
           </a:p>
@@ -2669,7 +2672,7 @@
           <a:p>
             <a:fld id="{0F2E0057-352E-4528-A89B-462E0D2D677A}" type="datetimeFigureOut">
               <a:rPr lang="en-US" smtClean="0"/>
-              <a:t>2024-12-15</a:t>
+              <a:t>12/16/2024</a:t>
             </a:fld>
             <a:endParaRPr lang="en-US"/>
           </a:p>
@@ -2910,7 +2913,7 @@
           <a:p>
             <a:fld id="{0F2E0057-352E-4528-A89B-462E0D2D677A}" type="datetimeFigureOut">
               <a:rPr lang="en-US" smtClean="0"/>
-              <a:t>2024-12-15</a:t>
+              <a:t>12/16/2024</a:t>
             </a:fld>
             <a:endParaRPr lang="en-US"/>
           </a:p>
@@ -4798,6 +4801,111 @@
                                   </p:childTnLst>
                                 </p:cTn>
                               </p:par>
+                              <p:par>
+                                <p:cTn id="44" presetID="21" presetClass="entr" presetSubtype="1" fill="hold" nodeType="withEffect">
+                                  <p:stCondLst>
+                                    <p:cond delay="1250"/>
+                                  </p:stCondLst>
+                                  <p:childTnLst>
+                                    <p:set>
+                                      <p:cBhvr>
+                                        <p:cTn id="45" dur="1" fill="hold">
+                                          <p:stCondLst>
+                                            <p:cond delay="0"/>
+                                          </p:stCondLst>
+                                        </p:cTn>
+                                        <p:tgtEl>
+                                          <p:spTgt spid="6"/>
+                                        </p:tgtEl>
+                                        <p:attrNameLst>
+                                          <p:attrName>style.visibility</p:attrName>
+                                        </p:attrNameLst>
+                                      </p:cBhvr>
+                                      <p:to>
+                                        <p:strVal val="visible"/>
+                                      </p:to>
+                                    </p:set>
+                                    <p:animEffect transition="in" filter="wheel(1)">
+                                      <p:cBhvr>
+                                        <p:cTn id="46" dur="2000"/>
+                                        <p:tgtEl>
+                                          <p:spTgt spid="6"/>
+                                        </p:tgtEl>
+                                      </p:cBhvr>
+                                    </p:animEffect>
+                                  </p:childTnLst>
+                                </p:cTn>
+                              </p:par>
+                              <p:par>
+                                <p:cTn id="47" presetID="21" presetClass="entr" presetSubtype="1" fill="hold" nodeType="withEffect">
+                                  <p:stCondLst>
+                                    <p:cond delay="1500"/>
+                                  </p:stCondLst>
+                                  <p:childTnLst>
+                                    <p:set>
+                                      <p:cBhvr>
+                                        <p:cTn id="48" dur="1" fill="hold">
+                                          <p:stCondLst>
+                                            <p:cond delay="0"/>
+                                          </p:stCondLst>
+                                        </p:cTn>
+                                        <p:tgtEl>
+                                          <p:spTgt spid="8"/>
+                                        </p:tgtEl>
+                                        <p:attrNameLst>
+                                          <p:attrName>style.visibility</p:attrName>
+                                        </p:attrNameLst>
+                                      </p:cBhvr>
+                                      <p:to>
+                                        <p:strVal val="visible"/>
+                                      </p:to>
+                                    </p:set>
+                                    <p:animEffect transition="in" filter="wheel(1)">
+                                      <p:cBhvr>
+                                        <p:cTn id="49" dur="2000"/>
+                                        <p:tgtEl>
+                                          <p:spTgt spid="8"/>
+                                        </p:tgtEl>
+                                      </p:cBhvr>
+                                    </p:animEffect>
+                                  </p:childTnLst>
+                                </p:cTn>
+                              </p:par>
+                              <p:par>
+                                <p:cTn id="50" presetID="21" presetClass="entr" presetSubtype="1" fill="hold" nodeType="withEffect">
+                                  <p:stCondLst>
+                                    <p:cond delay="1750"/>
+                                  </p:stCondLst>
+                                  <p:childTnLst>
+                                    <p:set>
+                                      <p:cBhvr>
+                                        <p:cTn id="51" dur="1" fill="hold">
+                                          <p:stCondLst>
+                                            <p:cond delay="0"/>
+                                          </p:stCondLst>
+                                        </p:cTn>
+                                        <p:tgtEl>
+                                          <p:spTgt spid="10"/>
+                                        </p:tgtEl>
+                                        <p:attrNameLst>
+                                          <p:attrName>style.visibility</p:attrName>
+                                        </p:attrNameLst>
+                                      </p:cBhvr>
+                                      <p:to>
+                                        <p:strVal val="visible"/>
+                                      </p:to>
+                                    </p:set>
+                                    <p:animEffect transition="in" filter="wheel(1)">
+                                      <p:cBhvr>
+                                        <p:cTn id="52" dur="2000"/>
+                                        <p:tgtEl>
+                                          <p:spTgt spid="10"/>
+                                        </p:tgtEl>
+                                      </p:cBhvr>
+                                    </p:animEffect>
+                                  </p:childTnLst>
+                                </p:cTn>
+                              </p:par>
                             </p:childTnLst>
                           </p:cTn>
                         </p:par>
@@ -4860,7 +4968,7 @@
           <p:cNvPr id="2" name="Title 1">
             <a:extLst>
               <a:ext uri="{FF2B5EF4-FFF2-40B4-BE49-F238E27FC236}">
-                <a16:creationId xmlns:a16="http://schemas.microsoft.com/office/drawing/2014/main" id="{743DB3F0-EDF8-D7B3-EF21-FAB2564B2915}"/>
+                <a16:creationId xmlns:a16="http://schemas.microsoft.com/office/drawing/2014/main" id="{B5D7FB90-2435-ED02-A11A-9BC90248904B}"/>
               </a:ext>
             </a:extLst>
           </p:cNvPr>
@@ -4885,7 +4993,7 @@
           <p:cNvPr id="3" name="Content Placeholder 2">
             <a:extLst>
               <a:ext uri="{FF2B5EF4-FFF2-40B4-BE49-F238E27FC236}">
-                <a16:creationId xmlns:a16="http://schemas.microsoft.com/office/drawing/2014/main" id="{BC4EB7D2-040C-4015-9C20-E9A7616168BE}"/>
+                <a16:creationId xmlns:a16="http://schemas.microsoft.com/office/drawing/2014/main" id="{5DDB6AE0-E1B6-9A8B-2B43-A3E689865942}"/>
               </a:ext>
             </a:extLst>
           </p:cNvPr>
@@ -4905,6 +5013,284 @@
           </a:p>
         </p:txBody>
       </p:sp>
+    </p:spTree>
+    <p:extLst>
+      <p:ext uri="{BB962C8B-B14F-4D97-AF65-F5344CB8AC3E}">
+        <p14:creationId xmlns:p14="http://schemas.microsoft.com/office/powerpoint/2010/main" val="35543980"/>
+      </p:ext>
+    </p:extLst>
+  </p:cSld>
+  <p:clrMapOvr>
+    <a:masterClrMapping/>
+  </p:clrMapOvr>
+</p:sld>
+</file>
+
+<file path=ppt/slides/slide3.xml><?xml version="1.0" encoding="utf-8"?>
+<p:sld xmlns:a="http://schemas.openxmlformats.org/drawingml/2006/main" xmlns:r="http://schemas.openxmlformats.org/officeDocument/2006/relationships" xmlns:p="http://schemas.openxmlformats.org/presentationml/2006/main">
+  <p:cSld>
+    <p:spTree>
+      <p:nvGrpSpPr>
+        <p:cNvPr id="1" name=""/>
+        <p:cNvGrpSpPr/>
+        <p:nvPr/>
+      </p:nvGrpSpPr>
+      <p:grpSpPr>
+        <a:xfrm>
+          <a:off x="0" y="0"/>
+          <a:ext cx="0" cy="0"/>
+          <a:chOff x="0" y="0"/>
+          <a:chExt cx="0" cy="0"/>
+        </a:xfrm>
+      </p:grpSpPr>
+      <p:sp>
+        <p:nvSpPr>
+          <p:cNvPr id="2" name="Title 1">
+            <a:extLst>
+              <a:ext uri="{FF2B5EF4-FFF2-40B4-BE49-F238E27FC236}">
+                <a16:creationId xmlns:a16="http://schemas.microsoft.com/office/drawing/2014/main" id="{F4956C43-3F52-6F00-4680-0C474A39A361}"/>
+              </a:ext>
+            </a:extLst>
+          </p:cNvPr>
+          <p:cNvSpPr>
+            <a:spLocks noGrp="1"/>
+          </p:cNvSpPr>
+          <p:nvPr>
+            <p:ph type="title"/>
+          </p:nvPr>
+        </p:nvSpPr>
+        <p:spPr/>
+        <p:txBody>
+          <a:bodyPr/>
+          <a:lstStyle/>
+          <a:p>
+            <a:endParaRPr lang="en-US"/>
+          </a:p>
+        </p:txBody>
+      </p:sp>
+      <p:sp>
+        <p:nvSpPr>
+          <p:cNvPr id="3" name="Content Placeholder 2">
+            <a:extLst>
+              <a:ext uri="{FF2B5EF4-FFF2-40B4-BE49-F238E27FC236}">
+                <a16:creationId xmlns:a16="http://schemas.microsoft.com/office/drawing/2014/main" id="{48BFF26D-D383-6B03-821A-DD5DE3E3D540}"/>
+              </a:ext>
+            </a:extLst>
+          </p:cNvPr>
+          <p:cNvSpPr>
+            <a:spLocks noGrp="1"/>
+          </p:cNvSpPr>
+          <p:nvPr>
+            <p:ph idx="1"/>
+          </p:nvPr>
+        </p:nvSpPr>
+        <p:spPr/>
+        <p:txBody>
+          <a:bodyPr/>
+          <a:lstStyle/>
+          <a:p>
+            <a:endParaRPr lang="en-US"/>
+          </a:p>
+        </p:txBody>
+      </p:sp>
+    </p:spTree>
+    <p:extLst>
+      <p:ext uri="{BB962C8B-B14F-4D97-AF65-F5344CB8AC3E}">
+        <p14:creationId xmlns:p14="http://schemas.microsoft.com/office/powerpoint/2010/main" val="3192255523"/>
+      </p:ext>
+    </p:extLst>
+  </p:cSld>
+  <p:clrMapOvr>
+    <a:masterClrMapping/>
+  </p:clrMapOvr>
+</p:sld>
+</file>
+
+<file path=ppt/slides/slide4.xml><?xml version="1.0" encoding="utf-8"?>
+<p:sld xmlns:a="http://schemas.openxmlformats.org/drawingml/2006/main" xmlns:r="http://schemas.openxmlformats.org/officeDocument/2006/relationships" xmlns:p="http://schemas.openxmlformats.org/presentationml/2006/main">
+  <p:cSld>
+    <p:spTree>
+      <p:nvGrpSpPr>
+        <p:cNvPr id="1" name=""/>
+        <p:cNvGrpSpPr/>
+        <p:nvPr/>
+      </p:nvGrpSpPr>
+      <p:grpSpPr>
+        <a:xfrm>
+          <a:off x="0" y="0"/>
+          <a:ext cx="0" cy="0"/>
+          <a:chOff x="0" y="0"/>
+          <a:chExt cx="0" cy="0"/>
+        </a:xfrm>
+      </p:grpSpPr>
+      <p:sp>
+        <p:nvSpPr>
+          <p:cNvPr id="2" name="Title 1">
+            <a:extLst>
+              <a:ext uri="{FF2B5EF4-FFF2-40B4-BE49-F238E27FC236}">
+                <a16:creationId xmlns:a16="http://schemas.microsoft.com/office/drawing/2014/main" id="{C6874F0F-BCE0-C344-272B-EEB4B64485F8}"/>
+              </a:ext>
+            </a:extLst>
+          </p:cNvPr>
+          <p:cNvSpPr>
+            <a:spLocks noGrp="1"/>
+          </p:cNvSpPr>
+          <p:nvPr>
+            <p:ph type="title"/>
+          </p:nvPr>
+        </p:nvSpPr>
+        <p:spPr/>
+        <p:txBody>
+          <a:bodyPr/>
+          <a:lstStyle/>
+          <a:p>
+            <a:endParaRPr lang="en-US"/>
+          </a:p>
+        </p:txBody>
+      </p:sp>
+      <p:sp>
+        <p:nvSpPr>
+          <p:cNvPr id="3" name="Content Placeholder 2">
+            <a:extLst>
+              <a:ext uri="{FF2B5EF4-FFF2-40B4-BE49-F238E27FC236}">
+                <a16:creationId xmlns:a16="http://schemas.microsoft.com/office/drawing/2014/main" id="{4DEC9DDD-99B0-3552-CB06-7A30196E7115}"/>
+              </a:ext>
+            </a:extLst>
+          </p:cNvPr>
+          <p:cNvSpPr>
+            <a:spLocks noGrp="1"/>
+          </p:cNvSpPr>
+          <p:nvPr>
+            <p:ph idx="1"/>
+          </p:nvPr>
+        </p:nvSpPr>
+        <p:spPr/>
+        <p:txBody>
+          <a:bodyPr/>
+          <a:lstStyle/>
+          <a:p>
+            <a:endParaRPr lang="en-US"/>
+          </a:p>
+        </p:txBody>
+      </p:sp>
+    </p:spTree>
+    <p:extLst>
+      <p:ext uri="{BB962C8B-B14F-4D97-AF65-F5344CB8AC3E}">
+        <p14:creationId xmlns:p14="http://schemas.microsoft.com/office/powerpoint/2010/main" val="188135651"/>
+      </p:ext>
+    </p:extLst>
+  </p:cSld>
+  <p:clrMapOvr>
+    <a:masterClrMapping/>
+  </p:clrMapOvr>
+</p:sld>
+</file>
+
+<file path=ppt/slides/slide5.xml><?xml version="1.0" encoding="utf-8"?>
+<p:sld xmlns:a="http://schemas.openxmlformats.org/drawingml/2006/main" xmlns:r="http://schemas.openxmlformats.org/officeDocument/2006/relationships" xmlns:p="http://schemas.openxmlformats.org/presentationml/2006/main">
+  <p:cSld>
+    <p:spTree>
+      <p:nvGrpSpPr>
+        <p:cNvPr id="1" name=""/>
+        <p:cNvGrpSpPr/>
+        <p:nvPr/>
+      </p:nvGrpSpPr>
+      <p:grpSpPr>
+        <a:xfrm>
+          <a:off x="0" y="0"/>
+          <a:ext cx="0" cy="0"/>
+          <a:chOff x="0" y="0"/>
+          <a:chExt cx="0" cy="0"/>
+        </a:xfrm>
+      </p:grpSpPr>
+      <p:sp>
+        <p:nvSpPr>
+          <p:cNvPr id="10" name="Rectangle 9">
+            <a:extLst>
+              <a:ext uri="{FF2B5EF4-FFF2-40B4-BE49-F238E27FC236}">
+                <a16:creationId xmlns:a16="http://schemas.microsoft.com/office/drawing/2014/main" id="{AC6B89F3-FF68-43AA-C284-B38BA9ECD61A}"/>
+              </a:ext>
+            </a:extLst>
+          </p:cNvPr>
+          <p:cNvSpPr/>
+          <p:nvPr/>
+        </p:nvSpPr>
+        <p:spPr>
+          <a:xfrm>
+            <a:off x="0" y="0"/>
+            <a:ext cx="12192000" cy="12094029"/>
+          </a:xfrm>
+          <a:prstGeom prst="rect">
+            <a:avLst/>
+          </a:prstGeom>
+          <a:solidFill>
+            <a:srgbClr val="1070AA"/>
+          </a:solidFill>
+          <a:ln>
+            <a:noFill/>
+          </a:ln>
+        </p:spPr>
+        <p:style>
+          <a:lnRef idx="2">
+            <a:schemeClr val="accent1">
+              <a:shade val="15000"/>
+            </a:schemeClr>
+          </a:lnRef>
+          <a:fillRef idx="1">
+            <a:schemeClr val="accent1"/>
+          </a:fillRef>
+          <a:effectRef idx="0">
+            <a:schemeClr val="accent1"/>
+          </a:effectRef>
+          <a:fontRef idx="minor">
+            <a:schemeClr val="lt1"/>
+          </a:fontRef>
+        </p:style>
+        <p:txBody>
+          <a:bodyPr rtlCol="0" anchor="ctr"/>
+          <a:lstStyle/>
+          <a:p>
+            <a:pPr algn="ctr"/>
+            <a:endParaRPr lang="en-US"/>
+          </a:p>
+        </p:txBody>
+      </p:sp>
+      <p:pic>
+        <p:nvPicPr>
+          <p:cNvPr id="7" name="Picture 6" descr="A blue screen with a qr code&#10;&#10;Description automatically generated">
+            <a:extLst>
+              <a:ext uri="{FF2B5EF4-FFF2-40B4-BE49-F238E27FC236}">
+                <a16:creationId xmlns:a16="http://schemas.microsoft.com/office/drawing/2014/main" id="{68F7E0EB-F5BC-A05F-0513-8B7117BF7380}"/>
+              </a:ext>
+            </a:extLst>
+          </p:cNvPr>
+          <p:cNvPicPr>
+            <a:picLocks noChangeAspect="1"/>
+          </p:cNvPicPr>
+          <p:nvPr/>
+        </p:nvPicPr>
+        <p:blipFill>
+          <a:blip r:embed="rId2">
+            <a:extLst>
+              <a:ext uri="{28A0092B-C50C-407E-A947-70E740481C1C}">
+                <a14:useLocalDpi xmlns:a14="http://schemas.microsoft.com/office/drawing/2010/main" val="0"/>
+              </a:ext>
+            </a:extLst>
+          </a:blip>
+          <a:stretch>
+            <a:fillRect/>
+          </a:stretch>
+        </p:blipFill>
+        <p:spPr>
+          <a:xfrm>
+            <a:off x="1699342" y="663102"/>
+            <a:ext cx="7999829" cy="5531796"/>
+          </a:xfrm>
+          <a:prstGeom prst="rect">
+            <a:avLst/>
+          </a:prstGeom>
+        </p:spPr>
+      </p:pic>
     </p:spTree>
     <p:extLst>
       <p:ext uri="{BB962C8B-B14F-4D97-AF65-F5344CB8AC3E}">
@@ -4915,6 +5301,123 @@
   <p:clrMapOvr>
     <a:masterClrMapping/>
   </p:clrMapOvr>
+  <p:timing>
+    <p:tnLst>
+      <p:par>
+        <p:cTn id="1" dur="indefinite" restart="never" nodeType="tmRoot">
+          <p:childTnLst>
+            <p:seq concurrent="1" nextAc="seek">
+              <p:cTn id="2" dur="indefinite" nodeType="mainSeq">
+                <p:childTnLst>
+                  <p:par>
+                    <p:cTn id="3" fill="hold">
+                      <p:stCondLst>
+                        <p:cond delay="indefinite"/>
+                        <p:cond evt="onBegin" delay="0">
+                          <p:tn val="2"/>
+                        </p:cond>
+                      </p:stCondLst>
+                      <p:childTnLst>
+                        <p:par>
+                          <p:cTn id="4" fill="hold">
+                            <p:stCondLst>
+                              <p:cond delay="0"/>
+                            </p:stCondLst>
+                            <p:childTnLst>
+                              <p:par>
+                                <p:cTn id="5" presetID="1" presetClass="entr" presetSubtype="0" fill="hold" nodeType="afterEffect">
+                                  <p:stCondLst>
+                                    <p:cond delay="50"/>
+                                  </p:stCondLst>
+                                  <p:childTnLst>
+                                    <p:set>
+                                      <p:cBhvr>
+                                        <p:cTn id="6" dur="1" fill="hold">
+                                          <p:stCondLst>
+                                            <p:cond delay="0"/>
+                                          </p:stCondLst>
+                                        </p:cTn>
+                                        <p:tgtEl>
+                                          <p:spTgt spid="7"/>
+                                        </p:tgtEl>
+                                        <p:attrNameLst>
+                                          <p:attrName>style.visibility</p:attrName>
+                                        </p:attrNameLst>
+                                      </p:cBhvr>
+                                      <p:to>
+                                        <p:strVal val="visible"/>
+                                      </p:to>
+                                    </p:set>
+                                  </p:childTnLst>
+                                </p:cTn>
+                              </p:par>
+                            </p:childTnLst>
+                          </p:cTn>
+                        </p:par>
+                        <p:par>
+                          <p:cTn id="7" fill="hold">
+                            <p:stCondLst>
+                              <p:cond delay="50"/>
+                            </p:stCondLst>
+                            <p:childTnLst>
+                              <p:par>
+                                <p:cTn id="8" presetID="1" presetClass="entr" presetSubtype="0" fill="hold" grpId="0" nodeType="afterEffect">
+                                  <p:stCondLst>
+                                    <p:cond delay="0"/>
+                                  </p:stCondLst>
+                                  <p:childTnLst>
+                                    <p:set>
+                                      <p:cBhvr>
+                                        <p:cTn id="9" dur="1" fill="hold">
+                                          <p:stCondLst>
+                                            <p:cond delay="0"/>
+                                          </p:stCondLst>
+                                        </p:cTn>
+                                        <p:tgtEl>
+                                          <p:spTgt spid="10"/>
+                                        </p:tgtEl>
+                                        <p:attrNameLst>
+                                          <p:attrName>style.visibility</p:attrName>
+                                        </p:attrNameLst>
+                                      </p:cBhvr>
+                                      <p:to>
+                                        <p:strVal val="visible"/>
+                                      </p:to>
+                                    </p:set>
+                                  </p:childTnLst>
+                                </p:cTn>
+                              </p:par>
+                            </p:childTnLst>
+                          </p:cTn>
+                        </p:par>
+                      </p:childTnLst>
+                    </p:cTn>
+                  </p:par>
+                </p:childTnLst>
+              </p:cTn>
+              <p:prevCondLst>
+                <p:cond evt="onPrev" delay="0">
+                  <p:tgtEl>
+                    <p:sldTgt/>
+                  </p:tgtEl>
+                </p:cond>
+              </p:prevCondLst>
+              <p:nextCondLst>
+                <p:cond evt="onNext" delay="0">
+                  <p:tgtEl>
+                    <p:sldTgt/>
+                  </p:tgtEl>
+                </p:cond>
+              </p:nextCondLst>
+            </p:seq>
+          </p:childTnLst>
+        </p:cTn>
+      </p:par>
+    </p:tnLst>
+    <p:bldLst>
+      <p:bldP spid="10" grpId="0" animBg="1"/>
+    </p:bldLst>
+  </p:timing>
 </p:sld>
 </file>
 

</xml_diff>

<commit_message>
that size was way, way off. Changed it to this...
</commit_message>
<xml_diff>
--- a/Current Presentation/Charlie Fall Term 2024 presentation.pptx
+++ b/Current Presentation/Charlie Fall Term 2024 presentation.pptx
@@ -6276,7 +6276,7 @@
             </a:extLst>
           </p:cNvPr>
           <p:cNvPicPr>
-            <a:picLocks noChangeAspect="1"/>
+            <a:picLocks/>
           </p:cNvPicPr>
           <p:nvPr/>
         </p:nvPicPr>
@@ -6295,7 +6295,7 @@
         <p:spPr>
           <a:xfrm>
             <a:off x="3986784" y="2395728"/>
-            <a:ext cx="11182350" cy="7715250"/>
+            <a:ext cx="3584448" cy="2473086"/>
           </a:xfrm>
           <a:prstGeom prst="rect">
             <a:avLst/>

</xml_diff>